<commit_message>
added slide Problematik to .pptx
</commit_message>
<xml_diff>
--- a/Präsentation/Präsentation.pptx
+++ b/Präsentation/Präsentation.pptx
@@ -7,7 +7,8 @@
   <p:sldIdLst>
     <p:sldId id="260" r:id="rId5"/>
     <p:sldId id="259" r:id="rId6"/>
-    <p:sldId id="258" r:id="rId7"/>
+    <p:sldId id="261" r:id="rId7"/>
+    <p:sldId id="258" r:id="rId8"/>
   </p:sldIdLst>
   <p:sldSz cx="12192000" cy="6858000"/>
   <p:notesSz cx="6858000" cy="9144000"/>
@@ -186,6 +187,118 @@
           <inkml:channelProperty channel="F" name="resolution" value="0" units="1/dev"/>
         </inkml:channelProperties>
       </inkml:inkSource>
+      <inkml:timestamp xml:id="ts0" timeString="2023-01-15T15:00:15.739"/>
+    </inkml:context>
+    <inkml:brush xml:id="br0">
+      <inkml:brushProperty name="width" value="0.35" units="cm"/>
+      <inkml:brushProperty name="height" value="0.35" units="cm"/>
+      <inkml:brushProperty name="color" value="#FFFFFF"/>
+    </inkml:brush>
+  </inkml:definitions>
+  <inkml:trace contextRef="#ctx0" brushRef="#br0">1 64 24575,'0'-5'0,"0"-5"0,0-11 0,0-6 0</inkml:trace>
+</inkml:ink>
+</file>
+
+<file path=ppt/ink/ink4.xml><?xml version="1.0" encoding="utf-8"?>
+<inkml:ink xmlns:inkml="http://www.w3.org/2003/InkML">
+  <inkml:definitions>
+    <inkml:context xml:id="ctx0">
+      <inkml:inkSource xml:id="inkSrc0">
+        <inkml:traceFormat>
+          <inkml:channel name="X" type="integer" min="-2.14748E9" max="2.14748E9" units="cm"/>
+          <inkml:channel name="Y" type="integer" min="-2.14748E9" max="2.14748E9" units="cm"/>
+          <inkml:channel name="F" type="integer" max="32767" units="dev"/>
+        </inkml:traceFormat>
+        <inkml:channelProperties>
+          <inkml:channelProperty channel="X" name="resolution" value="1000" units="1/cm"/>
+          <inkml:channelProperty channel="Y" name="resolution" value="1000" units="1/cm"/>
+          <inkml:channelProperty channel="F" name="resolution" value="0" units="1/dev"/>
+        </inkml:channelProperties>
+      </inkml:inkSource>
+      <inkml:timestamp xml:id="ts0" timeString="2023-01-15T15:00:16.543"/>
+    </inkml:context>
+    <inkml:brush xml:id="br0">
+      <inkml:brushProperty name="width" value="0.35" units="cm"/>
+      <inkml:brushProperty name="height" value="0.35" units="cm"/>
+      <inkml:brushProperty name="color" value="#FFFFFF"/>
+    </inkml:brush>
+  </inkml:definitions>
+  <inkml:trace contextRef="#ctx0" brushRef="#br0">73 6 24575,'-5'0'0,"-5"0"0,-7 0 0,-4 0 0,2-5 0</inkml:trace>
+</inkml:ink>
+</file>
+
+<file path=ppt/ink/ink5.xml><?xml version="1.0" encoding="utf-8"?>
+<inkml:ink xmlns:inkml="http://www.w3.org/2003/InkML">
+  <inkml:definitions>
+    <inkml:context xml:id="ctx0">
+      <inkml:inkSource xml:id="inkSrc0">
+        <inkml:traceFormat>
+          <inkml:channel name="X" type="integer" min="-2.14748E9" max="2.14748E9" units="cm"/>
+          <inkml:channel name="Y" type="integer" min="-2.14748E9" max="2.14748E9" units="cm"/>
+          <inkml:channel name="F" type="integer" max="32767" units="dev"/>
+        </inkml:traceFormat>
+        <inkml:channelProperties>
+          <inkml:channelProperty channel="X" name="resolution" value="1000" units="1/cm"/>
+          <inkml:channelProperty channel="Y" name="resolution" value="1000" units="1/cm"/>
+          <inkml:channelProperty channel="F" name="resolution" value="0" units="1/dev"/>
+        </inkml:channelProperties>
+      </inkml:inkSource>
+      <inkml:timestamp xml:id="ts0" timeString="2023-02-03T10:32:18.042"/>
+    </inkml:context>
+    <inkml:brush xml:id="br0">
+      <inkml:brushProperty name="width" value="0.35" units="cm"/>
+      <inkml:brushProperty name="height" value="0.35" units="cm"/>
+      <inkml:brushProperty name="color" value="#FFFFFF"/>
+    </inkml:brush>
+  </inkml:definitions>
+  <inkml:trace contextRef="#ctx0" brushRef="#br0">20 213 24575,'1'0'0,"13"-2"0,-9-15 0,-6-6 0,-1 0 0,0 1 0,-2-1 0,-1 1 0,-9-28 0,10 37 0,-2-4 0,4 20 0,5 30 0,51 229 0,-51-229 0,-3-24 0,1 0 0,0 0 0,0 0 0,1-1 0,0 1 0,5 12 0,-6-77 0,-1 31 0,-1 8 0,1 0 0,1 0 0,2-19 0,-3 36 0,0-1 0,0 0 0,0 1 0,0-1 0,0 1 0,0-1 0,0 1 0,0-1 0,1 0 0,-1 1 0,0-1 0,0 1 0,0-1 0,1 1 0,-1-1 0,0 1 0,0-1 0,1 1 0,-1-1 0,1 1 0,-1-1 0,0 1 0,1 0 0,-1-1 0,1 1 0,0-1 0,4 15 0,1 28 0,-2 77-1365</inkml:trace>
+</inkml:ink>
+</file>
+
+<file path=ppt/ink/ink6.xml><?xml version="1.0" encoding="utf-8"?>
+<inkml:ink xmlns:inkml="http://www.w3.org/2003/InkML">
+  <inkml:definitions>
+    <inkml:context xml:id="ctx0">
+      <inkml:inkSource xml:id="inkSrc0">
+        <inkml:traceFormat>
+          <inkml:channel name="X" type="integer" min="-2.14748E9" max="2.14748E9" units="cm"/>
+          <inkml:channel name="Y" type="integer" min="-2.14748E9" max="2.14748E9" units="cm"/>
+          <inkml:channel name="F" type="integer" max="32767" units="dev"/>
+        </inkml:traceFormat>
+        <inkml:channelProperties>
+          <inkml:channelProperty channel="X" name="resolution" value="1000" units="1/cm"/>
+          <inkml:channelProperty channel="Y" name="resolution" value="1000" units="1/cm"/>
+          <inkml:channelProperty channel="F" name="resolution" value="0" units="1/dev"/>
+        </inkml:channelProperties>
+      </inkml:inkSource>
+      <inkml:timestamp xml:id="ts0" timeString="2023-02-03T10:32:20.002"/>
+    </inkml:context>
+    <inkml:brush xml:id="br0">
+      <inkml:brushProperty name="width" value="0.35" units="cm"/>
+      <inkml:brushProperty name="height" value="0.35" units="cm"/>
+      <inkml:brushProperty name="color" value="#FFFFFF"/>
+    </inkml:brush>
+  </inkml:definitions>
+  <inkml:trace contextRef="#ctx0" brushRef="#br0">338 0 24575,'-13'22'0,"-19"43"0,23-44 0,-1 0 0,-19 28 0,-78 84 0,90-112 0,14-18 0,1 0 0,-1 0 0,0 0 0,0 0 0,0 0 0,-1-1 0,1 1 0,-1-1 0,1 0 0,-5 2 0,7-4 0,0 0 0,-1 0 0,1 0 0,0 0 0,-1 0 0,1 0 0,0 0 0,0 0 0,-1-1 0,1 1 0,0 0 0,-1-1 0,1 1 0,0-1 0,0 0 0,0 1 0,-1-1 0,1 0 0,0 1 0,0-1 0,0 0 0,0 0 0,0 0 0,1 0 0,-1 0 0,0 0 0,0 0 0,1-1 0,-1 1 0,0 0 0,1 0 0,-1 0 0,1-1 0,-1-1 0,-5-13 0,1-1 0,1 0 0,0-1 0,2 1 0,-1-1 0,2-32 0,-7-42 0,1 59 0,7 33 0,0 0 0,0 0 0,0 0 0,0 0 0,0 1 0,0-1 0,0 0 0,0 0 0,0 0 0,0 0 0,0 0 0,0 0 0,-1 0 0,1 0 0,0 0 0,0 0 0,0 0 0,0 0 0,0 0 0,0 0 0,0 0 0,0 0 0,0 0 0,0 0 0,0 0 0,0 0 0,0 0 0,0 0 0,-1 0 0,1 0 0,0 0 0,0 0 0,0 0 0,0 0 0,0 0 0,0 0 0,0 0 0,0 0 0,0 0 0,0 0 0,0 0 0,0 0 0,0 0 0,-1 0 0,1 0 0,0 0 0,0 0 0,0 0 0,0 0 0,0 0 0,0 0 0,0 0 0,0 0 0,0 0 0,0 0 0,-2 20 0,2 227-1365</inkml:trace>
+</inkml:ink>
+</file>
+
+<file path=ppt/ink/ink7.xml><?xml version="1.0" encoding="utf-8"?>
+<inkml:ink xmlns:inkml="http://www.w3.org/2003/InkML">
+  <inkml:definitions>
+    <inkml:context xml:id="ctx0">
+      <inkml:inkSource xml:id="inkSrc0">
+        <inkml:traceFormat>
+          <inkml:channel name="X" type="integer" min="-2.14748E9" max="2.14748E9" units="cm"/>
+          <inkml:channel name="Y" type="integer" min="-2.14748E9" max="2.14748E9" units="cm"/>
+          <inkml:channel name="F" type="integer" max="32767" units="dev"/>
+        </inkml:traceFormat>
+        <inkml:channelProperties>
+          <inkml:channelProperty channel="X" name="resolution" value="1000" units="1/cm"/>
+          <inkml:channelProperty channel="Y" name="resolution" value="1000" units="1/cm"/>
+          <inkml:channelProperty channel="F" name="resolution" value="0" units="1/dev"/>
+        </inkml:channelProperties>
+      </inkml:inkSource>
       <inkml:timestamp xml:id="ts0" timeString="2023-01-15T15:00:11.786"/>
     </inkml:context>
     <inkml:brush xml:id="br0">
@@ -345,7 +458,7 @@
           <a:p>
             <a:fld id="{3E83C2FC-0B28-4047-BE51-90C05B0F801E}" type="datetimeFigureOut">
               <a:rPr lang="de-DE" smtClean="0"/>
-              <a:t>02.02.2023</a:t>
+              <a:t>03.02.2023</a:t>
             </a:fld>
             <a:endParaRPr lang="de-DE"/>
           </a:p>
@@ -543,7 +656,7 @@
           <a:p>
             <a:fld id="{3E83C2FC-0B28-4047-BE51-90C05B0F801E}" type="datetimeFigureOut">
               <a:rPr lang="de-DE" smtClean="0"/>
-              <a:t>02.02.2023</a:t>
+              <a:t>03.02.2023</a:t>
             </a:fld>
             <a:endParaRPr lang="de-DE"/>
           </a:p>
@@ -751,7 +864,7 @@
           <a:p>
             <a:fld id="{3E83C2FC-0B28-4047-BE51-90C05B0F801E}" type="datetimeFigureOut">
               <a:rPr lang="de-DE" smtClean="0"/>
-              <a:t>02.02.2023</a:t>
+              <a:t>03.02.2023</a:t>
             </a:fld>
             <a:endParaRPr lang="de-DE"/>
           </a:p>
@@ -949,7 +1062,7 @@
           <a:p>
             <a:fld id="{3E83C2FC-0B28-4047-BE51-90C05B0F801E}" type="datetimeFigureOut">
               <a:rPr lang="de-DE" smtClean="0"/>
-              <a:t>02.02.2023</a:t>
+              <a:t>03.02.2023</a:t>
             </a:fld>
             <a:endParaRPr lang="de-DE"/>
           </a:p>
@@ -1224,7 +1337,7 @@
           <a:p>
             <a:fld id="{3E83C2FC-0B28-4047-BE51-90C05B0F801E}" type="datetimeFigureOut">
               <a:rPr lang="de-DE" smtClean="0"/>
-              <a:t>02.02.2023</a:t>
+              <a:t>03.02.2023</a:t>
             </a:fld>
             <a:endParaRPr lang="de-DE"/>
           </a:p>
@@ -1489,7 +1602,7 @@
           <a:p>
             <a:fld id="{3E83C2FC-0B28-4047-BE51-90C05B0F801E}" type="datetimeFigureOut">
               <a:rPr lang="de-DE" smtClean="0"/>
-              <a:t>02.02.2023</a:t>
+              <a:t>03.02.2023</a:t>
             </a:fld>
             <a:endParaRPr lang="de-DE"/>
           </a:p>
@@ -1901,7 +2014,7 @@
           <a:p>
             <a:fld id="{3E83C2FC-0B28-4047-BE51-90C05B0F801E}" type="datetimeFigureOut">
               <a:rPr lang="de-DE" smtClean="0"/>
-              <a:t>02.02.2023</a:t>
+              <a:t>03.02.2023</a:t>
             </a:fld>
             <a:endParaRPr lang="de-DE"/>
           </a:p>
@@ -2042,7 +2155,7 @@
           <a:p>
             <a:fld id="{3E83C2FC-0B28-4047-BE51-90C05B0F801E}" type="datetimeFigureOut">
               <a:rPr lang="de-DE" smtClean="0"/>
-              <a:t>02.02.2023</a:t>
+              <a:t>03.02.2023</a:t>
             </a:fld>
             <a:endParaRPr lang="de-DE"/>
           </a:p>
@@ -2155,7 +2268,7 @@
           <a:p>
             <a:fld id="{3E83C2FC-0B28-4047-BE51-90C05B0F801E}" type="datetimeFigureOut">
               <a:rPr lang="de-DE" smtClean="0"/>
-              <a:t>02.02.2023</a:t>
+              <a:t>03.02.2023</a:t>
             </a:fld>
             <a:endParaRPr lang="de-DE"/>
           </a:p>
@@ -2466,7 +2579,7 @@
           <a:p>
             <a:fld id="{3E83C2FC-0B28-4047-BE51-90C05B0F801E}" type="datetimeFigureOut">
               <a:rPr lang="de-DE" smtClean="0"/>
-              <a:t>02.02.2023</a:t>
+              <a:t>03.02.2023</a:t>
             </a:fld>
             <a:endParaRPr lang="de-DE"/>
           </a:p>
@@ -2754,7 +2867,7 @@
           <a:p>
             <a:fld id="{3E83C2FC-0B28-4047-BE51-90C05B0F801E}" type="datetimeFigureOut">
               <a:rPr lang="de-DE" smtClean="0"/>
-              <a:t>02.02.2023</a:t>
+              <a:t>03.02.2023</a:t>
             </a:fld>
             <a:endParaRPr lang="de-DE"/>
           </a:p>
@@ -2995,7 +3108,7 @@
           <a:p>
             <a:fld id="{3E83C2FC-0B28-4047-BE51-90C05B0F801E}" type="datetimeFigureOut">
               <a:rPr lang="de-DE" smtClean="0"/>
-              <a:t>02.02.2023</a:t>
+              <a:t>03.02.2023</a:t>
             </a:fld>
             <a:endParaRPr lang="de-DE"/>
           </a:p>
@@ -3864,6 +3977,402 @@
 </file>
 
 <file path=ppt/slides/slide3.xml><?xml version="1.0" encoding="utf-8"?>
+<p:sld xmlns:a="http://schemas.openxmlformats.org/drawingml/2006/main" xmlns:r="http://schemas.openxmlformats.org/officeDocument/2006/relationships" xmlns:p="http://schemas.openxmlformats.org/presentationml/2006/main">
+  <p:cSld>
+    <p:spTree>
+      <p:nvGrpSpPr>
+        <p:cNvPr id="1" name=""/>
+        <p:cNvGrpSpPr/>
+        <p:nvPr/>
+      </p:nvGrpSpPr>
+      <p:grpSpPr>
+        <a:xfrm>
+          <a:off x="0" y="0"/>
+          <a:ext cx="0" cy="0"/>
+          <a:chOff x="0" y="0"/>
+          <a:chExt cx="0" cy="0"/>
+        </a:xfrm>
+      </p:grpSpPr>
+      <p:sp>
+        <p:nvSpPr>
+          <p:cNvPr id="2" name="Titel 1">
+            <a:extLst>
+              <a:ext uri="{FF2B5EF4-FFF2-40B4-BE49-F238E27FC236}">
+                <a16:creationId xmlns:a16="http://schemas.microsoft.com/office/drawing/2014/main" id="{C55B7172-CCF4-1FCC-2F4B-E88717FEF6A2}"/>
+              </a:ext>
+            </a:extLst>
+          </p:cNvPr>
+          <p:cNvSpPr>
+            <a:spLocks noGrp="1"/>
+          </p:cNvSpPr>
+          <p:nvPr>
+            <p:ph type="title"/>
+          </p:nvPr>
+        </p:nvSpPr>
+        <p:spPr>
+          <a:xfrm>
+            <a:off x="838200" y="0"/>
+            <a:ext cx="10515600" cy="1325563"/>
+          </a:xfrm>
+        </p:spPr>
+        <p:txBody>
+          <a:bodyPr/>
+          <a:lstStyle/>
+          <a:p>
+            <a:pPr algn="ctr"/>
+            <a:r>
+              <a:rPr lang="de-DE" dirty="0"/>
+              <a:t>Problematik – Finite Precision</a:t>
+            </a:r>
+          </a:p>
+        </p:txBody>
+      </p:sp>
+      <p:pic>
+        <p:nvPicPr>
+          <p:cNvPr id="7" name="Grafik 6">
+            <a:extLst>
+              <a:ext uri="{FF2B5EF4-FFF2-40B4-BE49-F238E27FC236}">
+                <a16:creationId xmlns:a16="http://schemas.microsoft.com/office/drawing/2014/main" id="{293E580F-AF9C-342C-DFE9-64A44598DED2}"/>
+              </a:ext>
+            </a:extLst>
+          </p:cNvPr>
+          <p:cNvPicPr>
+            <a:picLocks noChangeAspect="1"/>
+          </p:cNvPicPr>
+          <p:nvPr/>
+        </p:nvPicPr>
+        <p:blipFill rotWithShape="1">
+          <a:blip r:embed="rId2"/>
+          <a:srcRect l="426" t="568" b="-1"/>
+          <a:stretch/>
+        </p:blipFill>
+        <p:spPr>
+          <a:xfrm>
+            <a:off x="1321904" y="1132647"/>
+            <a:ext cx="9296400" cy="5218042"/>
+          </a:xfrm>
+          <a:prstGeom prst="rect">
+            <a:avLst/>
+          </a:prstGeom>
+        </p:spPr>
+      </p:pic>
+      <p:grpSp>
+        <p:nvGrpSpPr>
+          <p:cNvPr id="12" name="Gruppieren 11">
+            <a:extLst>
+              <a:ext uri="{FF2B5EF4-FFF2-40B4-BE49-F238E27FC236}">
+                <a16:creationId xmlns:a16="http://schemas.microsoft.com/office/drawing/2014/main" id="{67CA21D6-30C1-6854-AABC-C68DF30FF466}"/>
+              </a:ext>
+            </a:extLst>
+          </p:cNvPr>
+          <p:cNvGrpSpPr/>
+          <p:nvPr/>
+        </p:nvGrpSpPr>
+        <p:grpSpPr>
+          <a:xfrm>
+            <a:off x="10956060" y="693285"/>
+            <a:ext cx="26280" cy="68760"/>
+            <a:chOff x="10956060" y="693285"/>
+            <a:chExt cx="26280" cy="68760"/>
+          </a:xfrm>
+        </p:grpSpPr>
+        <mc:AlternateContent xmlns:mc="http://schemas.openxmlformats.org/markup-compatibility/2006">
+          <mc:Choice xmlns:p14="http://schemas.microsoft.com/office/powerpoint/2010/main" Requires="p14">
+            <p:contentPart p14:bwMode="auto" r:id="rId3">
+              <p14:nvContentPartPr>
+                <p14:cNvPr id="10" name="Freihand 9">
+                  <a:extLst>
+                    <a:ext uri="{FF2B5EF4-FFF2-40B4-BE49-F238E27FC236}">
+                      <a16:creationId xmlns:a16="http://schemas.microsoft.com/office/drawing/2014/main" id="{6B17EB37-C82C-6CFE-2447-04F157DCEEE4}"/>
+                    </a:ext>
+                  </a:extLst>
+                </p14:cNvPr>
+                <p14:cNvContentPartPr/>
+                <p14:nvPr/>
+              </p14:nvContentPartPr>
+              <p14:xfrm>
+                <a:off x="10981980" y="739005"/>
+                <a:ext cx="360" cy="23040"/>
+              </p14:xfrm>
+            </p:contentPart>
+          </mc:Choice>
+          <mc:Fallback>
+            <p:pic>
+              <p:nvPicPr>
+                <p:cNvPr id="10" name="Freihand 9">
+                  <a:extLst>
+                    <a:ext uri="{FF2B5EF4-FFF2-40B4-BE49-F238E27FC236}">
+                      <a16:creationId xmlns:a16="http://schemas.microsoft.com/office/drawing/2014/main" id="{6B17EB37-C82C-6CFE-2447-04F157DCEEE4}"/>
+                    </a:ext>
+                  </a:extLst>
+                </p:cNvPr>
+                <p:cNvPicPr/>
+                <p:nvPr/>
+              </p:nvPicPr>
+              <p:blipFill>
+                <a:blip r:embed="rId4"/>
+                <a:stretch>
+                  <a:fillRect/>
+                </a:stretch>
+              </p:blipFill>
+              <p:spPr>
+                <a:xfrm>
+                  <a:off x="10918980" y="676005"/>
+                  <a:ext cx="126000" cy="148680"/>
+                </a:xfrm>
+                <a:prstGeom prst="rect">
+                  <a:avLst/>
+                </a:prstGeom>
+              </p:spPr>
+            </p:pic>
+          </mc:Fallback>
+        </mc:AlternateContent>
+        <mc:AlternateContent xmlns:mc="http://schemas.openxmlformats.org/markup-compatibility/2006">
+          <mc:Choice xmlns:p14="http://schemas.microsoft.com/office/powerpoint/2010/main" Requires="p14">
+            <p:contentPart p14:bwMode="auto" r:id="rId5">
+              <p14:nvContentPartPr>
+                <p14:cNvPr id="11" name="Freihand 10">
+                  <a:extLst>
+                    <a:ext uri="{FF2B5EF4-FFF2-40B4-BE49-F238E27FC236}">
+                      <a16:creationId xmlns:a16="http://schemas.microsoft.com/office/drawing/2014/main" id="{D29ED21F-C1DA-FD6C-2354-7DE1360CB046}"/>
+                    </a:ext>
+                  </a:extLst>
+                </p14:cNvPr>
+                <p14:cNvContentPartPr/>
+                <p14:nvPr/>
+              </p14:nvContentPartPr>
+              <p14:xfrm>
+                <a:off x="10956060" y="693285"/>
+                <a:ext cx="26280" cy="2160"/>
+              </p14:xfrm>
+            </p:contentPart>
+          </mc:Choice>
+          <mc:Fallback>
+            <p:pic>
+              <p:nvPicPr>
+                <p:cNvPr id="11" name="Freihand 10">
+                  <a:extLst>
+                    <a:ext uri="{FF2B5EF4-FFF2-40B4-BE49-F238E27FC236}">
+                      <a16:creationId xmlns:a16="http://schemas.microsoft.com/office/drawing/2014/main" id="{D29ED21F-C1DA-FD6C-2354-7DE1360CB046}"/>
+                    </a:ext>
+                  </a:extLst>
+                </p:cNvPr>
+                <p:cNvPicPr/>
+                <p:nvPr/>
+              </p:nvPicPr>
+              <p:blipFill>
+                <a:blip r:embed="rId6"/>
+                <a:stretch>
+                  <a:fillRect/>
+                </a:stretch>
+              </p:blipFill>
+              <p:spPr>
+                <a:xfrm>
+                  <a:off x="10893060" y="630285"/>
+                  <a:ext cx="151920" cy="127800"/>
+                </a:xfrm>
+                <a:prstGeom prst="rect">
+                  <a:avLst/>
+                </a:prstGeom>
+              </p:spPr>
+            </p:pic>
+          </mc:Fallback>
+        </mc:AlternateContent>
+      </p:grpSp>
+      <mc:AlternateContent xmlns:mc="http://schemas.openxmlformats.org/markup-compatibility/2006">
+        <mc:Choice xmlns:p14="http://schemas.microsoft.com/office/powerpoint/2010/main" Requires="p14">
+          <p:contentPart p14:bwMode="auto" r:id="rId7">
+            <p14:nvContentPartPr>
+              <p14:cNvPr id="4" name="Freihand 3">
+                <a:extLst>
+                  <a:ext uri="{FF2B5EF4-FFF2-40B4-BE49-F238E27FC236}">
+                    <a16:creationId xmlns:a16="http://schemas.microsoft.com/office/drawing/2014/main" id="{F71BD57D-D12A-1A12-9262-7A002BBEF128}"/>
+                  </a:ext>
+                </a:extLst>
+              </p14:cNvPr>
+              <p14:cNvContentPartPr/>
+              <p14:nvPr/>
+            </p14:nvContentPartPr>
+            <p14:xfrm>
+              <a:off x="2110408" y="5829473"/>
+              <a:ext cx="36000" cy="146160"/>
+            </p14:xfrm>
+          </p:contentPart>
+        </mc:Choice>
+        <mc:Fallback>
+          <p:pic>
+            <p:nvPicPr>
+              <p:cNvPr id="4" name="Freihand 3">
+                <a:extLst>
+                  <a:ext uri="{FF2B5EF4-FFF2-40B4-BE49-F238E27FC236}">
+                    <a16:creationId xmlns:a16="http://schemas.microsoft.com/office/drawing/2014/main" id="{F71BD57D-D12A-1A12-9262-7A002BBEF128}"/>
+                  </a:ext>
+                </a:extLst>
+              </p:cNvPr>
+              <p:cNvPicPr/>
+              <p:nvPr/>
+            </p:nvPicPr>
+            <p:blipFill>
+              <a:blip r:embed="rId8"/>
+              <a:stretch>
+                <a:fillRect/>
+              </a:stretch>
+            </p:blipFill>
+            <p:spPr>
+              <a:xfrm>
+                <a:off x="2047408" y="5766833"/>
+                <a:ext cx="161640" cy="271800"/>
+              </a:xfrm>
+              <a:prstGeom prst="rect">
+                <a:avLst/>
+              </a:prstGeom>
+            </p:spPr>
+          </p:pic>
+        </mc:Fallback>
+      </mc:AlternateContent>
+      <mc:AlternateContent xmlns:mc="http://schemas.openxmlformats.org/markup-compatibility/2006">
+        <mc:Choice xmlns:p14="http://schemas.microsoft.com/office/powerpoint/2010/main" Requires="p14">
+          <p:contentPart p14:bwMode="auto" r:id="rId9">
+            <p14:nvContentPartPr>
+              <p14:cNvPr id="5" name="Freihand 4">
+                <a:extLst>
+                  <a:ext uri="{FF2B5EF4-FFF2-40B4-BE49-F238E27FC236}">
+                    <a16:creationId xmlns:a16="http://schemas.microsoft.com/office/drawing/2014/main" id="{5B429A77-0AFD-90F0-487D-C8C49565BBF0}"/>
+                  </a:ext>
+                </a:extLst>
+              </p14:cNvPr>
+              <p14:cNvContentPartPr/>
+              <p14:nvPr/>
+            </p14:nvContentPartPr>
+            <p14:xfrm>
+              <a:off x="9843208" y="5906153"/>
+              <a:ext cx="121680" cy="131040"/>
+            </p14:xfrm>
+          </p:contentPart>
+        </mc:Choice>
+        <mc:Fallback>
+          <p:pic>
+            <p:nvPicPr>
+              <p:cNvPr id="5" name="Freihand 4">
+                <a:extLst>
+                  <a:ext uri="{FF2B5EF4-FFF2-40B4-BE49-F238E27FC236}">
+                    <a16:creationId xmlns:a16="http://schemas.microsoft.com/office/drawing/2014/main" id="{5B429A77-0AFD-90F0-487D-C8C49565BBF0}"/>
+                  </a:ext>
+                </a:extLst>
+              </p:cNvPr>
+              <p:cNvPicPr/>
+              <p:nvPr/>
+            </p:nvPicPr>
+            <p:blipFill>
+              <a:blip r:embed="rId10"/>
+              <a:stretch>
+                <a:fillRect/>
+              </a:stretch>
+            </p:blipFill>
+            <p:spPr>
+              <a:xfrm>
+                <a:off x="9780568" y="5843153"/>
+                <a:ext cx="247320" cy="256680"/>
+              </a:xfrm>
+              <a:prstGeom prst="rect">
+                <a:avLst/>
+              </a:prstGeom>
+            </p:spPr>
+          </p:pic>
+        </mc:Fallback>
+      </mc:AlternateContent>
+      <p:sp>
+        <p:nvSpPr>
+          <p:cNvPr id="3" name="Textfeld 2">
+            <a:extLst>
+              <a:ext uri="{FF2B5EF4-FFF2-40B4-BE49-F238E27FC236}">
+                <a16:creationId xmlns:a16="http://schemas.microsoft.com/office/drawing/2014/main" id="{B1342D72-876A-A805-F26C-54D47A1034EE}"/>
+              </a:ext>
+            </a:extLst>
+          </p:cNvPr>
+          <p:cNvSpPr txBox="1"/>
+          <p:nvPr/>
+        </p:nvSpPr>
+        <p:spPr>
+          <a:xfrm>
+            <a:off x="564605" y="5610165"/>
+            <a:ext cx="1752403" cy="584775"/>
+          </a:xfrm>
+          <a:prstGeom prst="rect">
+            <a:avLst/>
+          </a:prstGeom>
+          <a:noFill/>
+        </p:spPr>
+        <p:txBody>
+          <a:bodyPr wrap="none" rtlCol="0">
+            <a:spAutoFit/>
+          </a:bodyPr>
+          <a:lstStyle/>
+          <a:p>
+            <a:r>
+              <a:rPr lang="de-DE" sz="3200" b="1" dirty="0">
+                <a:solidFill>
+                  <a:srgbClr val="FF0000"/>
+                </a:solidFill>
+              </a:rPr>
+              <a:t>0.000052</a:t>
+            </a:r>
+          </a:p>
+        </p:txBody>
+      </p:sp>
+      <p:sp>
+        <p:nvSpPr>
+          <p:cNvPr id="6" name="Textfeld 5">
+            <a:extLst>
+              <a:ext uri="{FF2B5EF4-FFF2-40B4-BE49-F238E27FC236}">
+                <a16:creationId xmlns:a16="http://schemas.microsoft.com/office/drawing/2014/main" id="{754E1381-4B9D-115E-7701-D362ACEB2633}"/>
+              </a:ext>
+            </a:extLst>
+          </p:cNvPr>
+          <p:cNvSpPr txBox="1"/>
+          <p:nvPr/>
+        </p:nvSpPr>
+        <p:spPr>
+          <a:xfrm>
+            <a:off x="9700991" y="5606522"/>
+            <a:ext cx="1752403" cy="584775"/>
+          </a:xfrm>
+          <a:prstGeom prst="rect">
+            <a:avLst/>
+          </a:prstGeom>
+          <a:noFill/>
+        </p:spPr>
+        <p:txBody>
+          <a:bodyPr wrap="none" rtlCol="0">
+            <a:spAutoFit/>
+          </a:bodyPr>
+          <a:lstStyle/>
+          <a:p>
+            <a:r>
+              <a:rPr lang="de-DE" sz="3200" b="1" dirty="0">
+                <a:solidFill>
+                  <a:srgbClr val="FF0000"/>
+                </a:solidFill>
+              </a:rPr>
+              <a:t>0.000052</a:t>
+            </a:r>
+          </a:p>
+        </p:txBody>
+      </p:sp>
+    </p:spTree>
+    <p:extLst>
+      <p:ext uri="{BB962C8B-B14F-4D97-AF65-F5344CB8AC3E}">
+        <p14:creationId xmlns:p14="http://schemas.microsoft.com/office/powerpoint/2010/main" val="699653536"/>
+      </p:ext>
+    </p:extLst>
+  </p:cSld>
+  <p:clrMapOvr>
+    <a:masterClrMapping/>
+  </p:clrMapOvr>
+</p:sld>
+</file>
+
+<file path=ppt/slides/slide4.xml><?xml version="1.0" encoding="utf-8"?>
 <p:sld xmlns:a="http://schemas.openxmlformats.org/drawingml/2006/main" xmlns:r="http://schemas.openxmlformats.org/officeDocument/2006/relationships" xmlns:p="http://schemas.openxmlformats.org/presentationml/2006/main">
   <p:cSld>
     <p:spTree>
@@ -4620,18 +5129,18 @@
 </file>
 
 <file path=customXml/item1.xml><?xml version="1.0" encoding="utf-8"?>
-<p:properties xmlns:p="http://schemas.microsoft.com/office/2006/metadata/properties" xmlns:xsi="http://www.w3.org/2001/XMLSchema-instance" xmlns:pc="http://schemas.microsoft.com/office/infopath/2007/PartnerControls">
-  <documentManagement/>
-</p:properties>
-</file>
-
-<file path=customXml/item2.xml><?xml version="1.0" encoding="utf-8"?>
 <?mso-contentType ?>
 <FormTemplates xmlns="http://schemas.microsoft.com/sharepoint/v3/contenttype/forms">
   <Display>DocumentLibraryForm</Display>
   <Edit>DocumentLibraryForm</Edit>
   <New>DocumentLibraryForm</New>
 </FormTemplates>
+</file>
+
+<file path=customXml/item2.xml><?xml version="1.0" encoding="utf-8"?>
+<p:properties xmlns:p="http://schemas.microsoft.com/office/2006/metadata/properties" xmlns:xsi="http://www.w3.org/2001/XMLSchema-instance" xmlns:pc="http://schemas.microsoft.com/office/infopath/2007/PartnerControls">
+  <documentManagement/>
+</p:properties>
 </file>
 
 <file path=customXml/item3.xml><?xml version="1.0" encoding="utf-8"?>
@@ -4749,24 +5258,24 @@
 </file>
 
 <file path=customXml/itemProps1.xml><?xml version="1.0" encoding="utf-8"?>
-<ds:datastoreItem xmlns:ds="http://schemas.openxmlformats.org/officeDocument/2006/customXml" ds:itemID="{3F33312B-FF67-46F2-9DCA-F37FB03B9503}">
+<ds:datastoreItem xmlns:ds="http://schemas.openxmlformats.org/officeDocument/2006/customXml" ds:itemID="{69F399BC-DB04-479A-947F-43280C8B72AC}">
   <ds:schemaRefs>
-    <ds:schemaRef ds:uri="http://schemas.microsoft.com/office/2006/metadata/properties"/>
-    <ds:schemaRef ds:uri="http://schemas.microsoft.com/office/2006/documentManagement/types"/>
-    <ds:schemaRef ds:uri="http://schemas.openxmlformats.org/package/2006/metadata/core-properties"/>
-    <ds:schemaRef ds:uri="http://purl.org/dc/dcmitype/"/>
-    <ds:schemaRef ds:uri="http://schemas.microsoft.com/office/infopath/2007/PartnerControls"/>
-    <ds:schemaRef ds:uri="http://www.w3.org/XML/1998/namespace"/>
-    <ds:schemaRef ds:uri="http://purl.org/dc/elements/1.1/"/>
-    <ds:schemaRef ds:uri="http://purl.org/dc/terms/"/>
+    <ds:schemaRef ds:uri="http://schemas.microsoft.com/sharepoint/v3/contenttype/forms"/>
   </ds:schemaRefs>
 </ds:datastoreItem>
 </file>
 
 <file path=customXml/itemProps2.xml><?xml version="1.0" encoding="utf-8"?>
-<ds:datastoreItem xmlns:ds="http://schemas.openxmlformats.org/officeDocument/2006/customXml" ds:itemID="{69F399BC-DB04-479A-947F-43280C8B72AC}">
+<ds:datastoreItem xmlns:ds="http://schemas.openxmlformats.org/officeDocument/2006/customXml" ds:itemID="{3F33312B-FF67-46F2-9DCA-F37FB03B9503}">
   <ds:schemaRefs>
-    <ds:schemaRef ds:uri="http://schemas.microsoft.com/sharepoint/v3/contenttype/forms"/>
+    <ds:schemaRef ds:uri="http://purl.org/dc/terms/"/>
+    <ds:schemaRef ds:uri="http://schemas.microsoft.com/office/2006/metadata/properties"/>
+    <ds:schemaRef ds:uri="http://schemas.microsoft.com/office/2006/documentManagement/types"/>
+    <ds:schemaRef ds:uri="http://schemas.microsoft.com/office/infopath/2007/PartnerControls"/>
+    <ds:schemaRef ds:uri="http://purl.org/dc/elements/1.1/"/>
+    <ds:schemaRef ds:uri="http://schemas.openxmlformats.org/package/2006/metadata/core-properties"/>
+    <ds:schemaRef ds:uri="http://www.w3.org/XML/1998/namespace"/>
+    <ds:schemaRef ds:uri="http://purl.org/dc/dcmitype/"/>
   </ds:schemaRefs>
 </ds:datastoreItem>
 </file>

</xml_diff>